<commit_message>
updated storyboard with draft script
</commit_message>
<xml_diff>
--- a/storyboard-draft.pptx
+++ b/storyboard-draft.pptx
@@ -8,12 +8,23 @@
     <p:sldId id="256" r:id="rId2"/>
     <p:sldId id="257" r:id="rId3"/>
     <p:sldId id="258" r:id="rId4"/>
-    <p:sldId id="259" r:id="rId5"/>
-    <p:sldId id="261" r:id="rId6"/>
-    <p:sldId id="262" r:id="rId7"/>
-    <p:sldId id="264" r:id="rId8"/>
-    <p:sldId id="263" r:id="rId9"/>
-    <p:sldId id="265" r:id="rId10"/>
+    <p:sldId id="266" r:id="rId5"/>
+    <p:sldId id="259" r:id="rId6"/>
+    <p:sldId id="267" r:id="rId7"/>
+    <p:sldId id="268" r:id="rId8"/>
+    <p:sldId id="261" r:id="rId9"/>
+    <p:sldId id="269" r:id="rId10"/>
+    <p:sldId id="270" r:id="rId11"/>
+    <p:sldId id="262" r:id="rId12"/>
+    <p:sldId id="271" r:id="rId13"/>
+    <p:sldId id="272" r:id="rId14"/>
+    <p:sldId id="264" r:id="rId15"/>
+    <p:sldId id="273" r:id="rId16"/>
+    <p:sldId id="274" r:id="rId17"/>
+    <p:sldId id="263" r:id="rId18"/>
+    <p:sldId id="275" r:id="rId19"/>
+    <p:sldId id="276" r:id="rId20"/>
+    <p:sldId id="265" r:id="rId21"/>
   </p:sldIdLst>
   <p:sldSz cx="12192000" cy="6858000"/>
   <p:notesSz cx="6858000" cy="9144000"/>
@@ -298,7 +309,7 @@
           <a:p>
             <a:fld id="{406896FD-7F84-DD41-B7F4-EF404D9B1DD8}" type="datetimeFigureOut">
               <a:rPr lang="en-US" smtClean="0"/>
-              <a:t>2/2/20</a:t>
+              <a:t>2/12/20</a:t>
             </a:fld>
             <a:endParaRPr lang="en-US"/>
           </a:p>
@@ -498,7 +509,7 @@
           <a:p>
             <a:fld id="{406896FD-7F84-DD41-B7F4-EF404D9B1DD8}" type="datetimeFigureOut">
               <a:rPr lang="en-US" smtClean="0"/>
-              <a:t>2/2/20</a:t>
+              <a:t>2/12/20</a:t>
             </a:fld>
             <a:endParaRPr lang="en-US"/>
           </a:p>
@@ -708,7 +719,7 @@
           <a:p>
             <a:fld id="{406896FD-7F84-DD41-B7F4-EF404D9B1DD8}" type="datetimeFigureOut">
               <a:rPr lang="en-US" smtClean="0"/>
-              <a:t>2/2/20</a:t>
+              <a:t>2/12/20</a:t>
             </a:fld>
             <a:endParaRPr lang="en-US"/>
           </a:p>
@@ -908,7 +919,7 @@
           <a:p>
             <a:fld id="{406896FD-7F84-DD41-B7F4-EF404D9B1DD8}" type="datetimeFigureOut">
               <a:rPr lang="en-US" smtClean="0"/>
-              <a:t>2/2/20</a:t>
+              <a:t>2/12/20</a:t>
             </a:fld>
             <a:endParaRPr lang="en-US"/>
           </a:p>
@@ -1184,7 +1195,7 @@
           <a:p>
             <a:fld id="{406896FD-7F84-DD41-B7F4-EF404D9B1DD8}" type="datetimeFigureOut">
               <a:rPr lang="en-US" smtClean="0"/>
-              <a:t>2/2/20</a:t>
+              <a:t>2/12/20</a:t>
             </a:fld>
             <a:endParaRPr lang="en-US"/>
           </a:p>
@@ -1452,7 +1463,7 @@
           <a:p>
             <a:fld id="{406896FD-7F84-DD41-B7F4-EF404D9B1DD8}" type="datetimeFigureOut">
               <a:rPr lang="en-US" smtClean="0"/>
-              <a:t>2/2/20</a:t>
+              <a:t>2/12/20</a:t>
             </a:fld>
             <a:endParaRPr lang="en-US"/>
           </a:p>
@@ -1867,7 +1878,7 @@
           <a:p>
             <a:fld id="{406896FD-7F84-DD41-B7F4-EF404D9B1DD8}" type="datetimeFigureOut">
               <a:rPr lang="en-US" smtClean="0"/>
-              <a:t>2/2/20</a:t>
+              <a:t>2/12/20</a:t>
             </a:fld>
             <a:endParaRPr lang="en-US"/>
           </a:p>
@@ -2009,7 +2020,7 @@
           <a:p>
             <a:fld id="{406896FD-7F84-DD41-B7F4-EF404D9B1DD8}" type="datetimeFigureOut">
               <a:rPr lang="en-US" smtClean="0"/>
-              <a:t>2/2/20</a:t>
+              <a:t>2/12/20</a:t>
             </a:fld>
             <a:endParaRPr lang="en-US"/>
           </a:p>
@@ -2122,7 +2133,7 @@
           <a:p>
             <a:fld id="{406896FD-7F84-DD41-B7F4-EF404D9B1DD8}" type="datetimeFigureOut">
               <a:rPr lang="en-US" smtClean="0"/>
-              <a:t>2/2/20</a:t>
+              <a:t>2/12/20</a:t>
             </a:fld>
             <a:endParaRPr lang="en-US"/>
           </a:p>
@@ -2435,7 +2446,7 @@
           <a:p>
             <a:fld id="{406896FD-7F84-DD41-B7F4-EF404D9B1DD8}" type="datetimeFigureOut">
               <a:rPr lang="en-US" smtClean="0"/>
-              <a:t>2/2/20</a:t>
+              <a:t>2/12/20</a:t>
             </a:fld>
             <a:endParaRPr lang="en-US"/>
           </a:p>
@@ -2724,7 +2735,7 @@
           <a:p>
             <a:fld id="{406896FD-7F84-DD41-B7F4-EF404D9B1DD8}" type="datetimeFigureOut">
               <a:rPr lang="en-US" smtClean="0"/>
-              <a:t>2/2/20</a:t>
+              <a:t>2/12/20</a:t>
             </a:fld>
             <a:endParaRPr lang="en-US"/>
           </a:p>
@@ -2967,7 +2978,7 @@
           <a:p>
             <a:fld id="{406896FD-7F84-DD41-B7F4-EF404D9B1DD8}" type="datetimeFigureOut">
               <a:rPr lang="en-US" smtClean="0"/>
-              <a:t>2/2/20</a:t>
+              <a:t>2/12/20</a:t>
             </a:fld>
             <a:endParaRPr lang="en-US"/>
           </a:p>
@@ -3457,7 +3468,7 @@
 </p:sld>
 </file>
 
-<file path=ppt/slides/slide2.xml><?xml version="1.0" encoding="utf-8"?>
+<file path=ppt/slides/slide10.xml><?xml version="1.0" encoding="utf-8"?>
 <p:sld xmlns:a="http://schemas.openxmlformats.org/drawingml/2006/main" xmlns:r="http://schemas.openxmlformats.org/officeDocument/2006/relationships" xmlns:p="http://schemas.openxmlformats.org/presentationml/2006/main">
   <p:cSld>
     <p:spTree>
@@ -3479,7 +3490,7 @@
           <p:cNvPr id="2" name="Title 1">
             <a:extLst>
               <a:ext uri="{FF2B5EF4-FFF2-40B4-BE49-F238E27FC236}">
-                <a16:creationId xmlns:a16="http://schemas.microsoft.com/office/drawing/2014/main" id="{AF6B02FC-3501-2E4D-ACF5-E7CC637787FF}"/>
+                <a16:creationId xmlns:a16="http://schemas.microsoft.com/office/drawing/2014/main" id="{B9395550-3173-2F44-A17F-ECB8F46226BF}"/>
               </a:ext>
             </a:extLst>
           </p:cNvPr>
@@ -3497,7 +3508,7 @@
           <a:p>
             <a:r>
               <a:rPr lang="en-US" dirty="0"/>
-              <a:t>Key points</a:t>
+              <a:t>What steps are we taking as Australians? – Script - Alex</a:t>
             </a:r>
           </a:p>
         </p:txBody>
@@ -3507,7 +3518,7 @@
           <p:cNvPr id="3" name="Content Placeholder 2">
             <a:extLst>
               <a:ext uri="{FF2B5EF4-FFF2-40B4-BE49-F238E27FC236}">
-                <a16:creationId xmlns:a16="http://schemas.microsoft.com/office/drawing/2014/main" id="{84048969-D2EF-9841-8E0B-112A49E0E98F}"/>
+                <a16:creationId xmlns:a16="http://schemas.microsoft.com/office/drawing/2014/main" id="{3EBFF5F1-1C5E-504D-BF65-3ECE78597D6D}"/>
               </a:ext>
             </a:extLst>
           </p:cNvPr>
@@ -3520,50 +3531,22 @@
         </p:nvSpPr>
         <p:spPr/>
         <p:txBody>
-          <a:bodyPr/>
-          <a:lstStyle/>
-          <a:p>
-            <a:r>
-              <a:rPr lang="en-US" dirty="0"/>
-              <a:t>Include </a:t>
-            </a:r>
-            <a:r>
-              <a:rPr lang="en-US" dirty="0" err="1"/>
-              <a:t>colour</a:t>
-            </a:r>
-            <a:r>
-              <a:rPr lang="en-US" dirty="0"/>
-              <a:t> and graphics</a:t>
-            </a:r>
-          </a:p>
-          <a:p>
-            <a:endParaRPr lang="en-US" dirty="0"/>
-          </a:p>
-          <a:p>
-            <a:r>
-              <a:rPr lang="en-US" dirty="0"/>
-              <a:t>Intro</a:t>
-            </a:r>
-          </a:p>
-          <a:p>
-            <a:r>
-              <a:rPr lang="en-US" dirty="0"/>
-              <a:t>Structure, logical progression</a:t>
-            </a:r>
-          </a:p>
-          <a:p>
-            <a:r>
-              <a:rPr lang="en-US" dirty="0"/>
-              <a:t>Be engaging</a:t>
-            </a:r>
-          </a:p>
-          <a:p>
-            <a:endParaRPr lang="en-US" dirty="0"/>
-          </a:p>
-          <a:p>
-            <a:r>
-              <a:rPr lang="en-US" dirty="0"/>
-              <a:t>Style – as per info</a:t>
+          <a:bodyPr>
+            <a:normAutofit/>
+          </a:bodyPr>
+          <a:lstStyle/>
+          <a:p>
+            <a:r>
+              <a:rPr lang="en-AU" dirty="0"/>
+              <a:t>Thanks for that, very informative.  So there is plenty of things there, but it seems like it’s a bit of a free for all.  What are we doing about it?   XXXX from the </a:t>
+            </a:r>
+            <a:r>
+              <a:rPr lang="en-AU" dirty="0" err="1"/>
+              <a:t>Prosight</a:t>
+            </a:r>
+            <a:r>
+              <a:rPr lang="en-AU" dirty="0"/>
+              <a:t> team, can you give us a bit of a rundown about how we’re going to address this problem?</a:t>
             </a:r>
           </a:p>
           <a:p>
@@ -3574,7 +3557,7 @@
     </p:spTree>
     <p:extLst>
       <p:ext uri="{BB962C8B-B14F-4D97-AF65-F5344CB8AC3E}">
-        <p14:creationId xmlns:p14="http://schemas.microsoft.com/office/powerpoint/2010/main" val="2113874010"/>
+        <p14:creationId xmlns:p14="http://schemas.microsoft.com/office/powerpoint/2010/main" val="581632041"/>
       </p:ext>
     </p:extLst>
   </p:cSld>
@@ -3584,7 +3567,7 @@
 </p:sld>
 </file>
 
-<file path=ppt/slides/slide3.xml><?xml version="1.0" encoding="utf-8"?>
+<file path=ppt/slides/slide11.xml><?xml version="1.0" encoding="utf-8"?>
 <p:sld xmlns:a="http://schemas.openxmlformats.org/drawingml/2006/main" xmlns:r="http://schemas.openxmlformats.org/officeDocument/2006/relationships" xmlns:p="http://schemas.openxmlformats.org/presentationml/2006/main">
   <p:cSld>
     <p:spTree>
@@ -3606,7 +3589,7 @@
           <p:cNvPr id="2" name="Title 1">
             <a:extLst>
               <a:ext uri="{FF2B5EF4-FFF2-40B4-BE49-F238E27FC236}">
-                <a16:creationId xmlns:a16="http://schemas.microsoft.com/office/drawing/2014/main" id="{EF84C814-87E4-B748-A17C-C4FD2F95F1ED}"/>
+                <a16:creationId xmlns:a16="http://schemas.microsoft.com/office/drawing/2014/main" id="{0AFF2694-842C-7D49-8743-E67E62B7CE29}"/>
               </a:ext>
             </a:extLst>
           </p:cNvPr>
@@ -3624,126 +3607,7 @@
           <a:p>
             <a:r>
               <a:rPr lang="en-US" dirty="0"/>
-              <a:t>Introduction – 15 seconds</a:t>
-            </a:r>
-          </a:p>
-        </p:txBody>
-      </p:sp>
-      <p:sp>
-        <p:nvSpPr>
-          <p:cNvPr id="3" name="Content Placeholder 2">
-            <a:extLst>
-              <a:ext uri="{FF2B5EF4-FFF2-40B4-BE49-F238E27FC236}">
-                <a16:creationId xmlns:a16="http://schemas.microsoft.com/office/drawing/2014/main" id="{0C29E474-F4E4-DE4E-A187-2BC2D31563CE}"/>
-              </a:ext>
-            </a:extLst>
-          </p:cNvPr>
-          <p:cNvSpPr>
-            <a:spLocks noGrp="1"/>
-          </p:cNvSpPr>
-          <p:nvPr>
-            <p:ph idx="1"/>
-          </p:nvPr>
-        </p:nvSpPr>
-        <p:spPr>
-          <a:xfrm>
-            <a:off x="838200" y="1825625"/>
-            <a:ext cx="10515600" cy="4351338"/>
-          </a:xfrm>
-        </p:spPr>
-        <p:txBody>
-          <a:bodyPr>
-            <a:normAutofit lnSpcReduction="10000"/>
-          </a:bodyPr>
-          <a:lstStyle/>
-          <a:p>
-            <a:r>
-              <a:rPr lang="en-US" dirty="0"/>
-              <a:t>Intro and what we are going to talk about</a:t>
-            </a:r>
-          </a:p>
-          <a:p>
-            <a:endParaRPr lang="en-US" dirty="0"/>
-          </a:p>
-          <a:p>
-            <a:r>
-              <a:rPr lang="en-AU" dirty="0"/>
-              <a:t>A 2018 report titled Programme for International Student Assessment (PISA) details the long-term decline in Australian students in Science, Reading and Mathematics subjects in comparison to Chinese students. Specifically, the report details that Australian students are on average 3.5 years behind Chinese students in mathematics. </a:t>
-            </a:r>
-          </a:p>
-          <a:p>
-            <a:endParaRPr lang="en-US" dirty="0"/>
-          </a:p>
-          <a:p>
-            <a:r>
-              <a:rPr lang="en-US" dirty="0"/>
-              <a:t>we’re joined by X from </a:t>
-            </a:r>
-            <a:r>
-              <a:rPr lang="en-US" dirty="0" err="1"/>
-              <a:t>Prosight</a:t>
-            </a:r>
-            <a:r>
-              <a:rPr lang="en-US" dirty="0"/>
-              <a:t> to talk to us about some of the challenges facing students today</a:t>
-            </a:r>
-          </a:p>
-        </p:txBody>
-      </p:sp>
-    </p:spTree>
-    <p:extLst>
-      <p:ext uri="{BB962C8B-B14F-4D97-AF65-F5344CB8AC3E}">
-        <p14:creationId xmlns:p14="http://schemas.microsoft.com/office/powerpoint/2010/main" val="704425647"/>
-      </p:ext>
-    </p:extLst>
-  </p:cSld>
-  <p:clrMapOvr>
-    <a:masterClrMapping/>
-  </p:clrMapOvr>
-</p:sld>
-</file>
-
-<file path=ppt/slides/slide4.xml><?xml version="1.0" encoding="utf-8"?>
-<p:sld xmlns:a="http://schemas.openxmlformats.org/drawingml/2006/main" xmlns:r="http://schemas.openxmlformats.org/officeDocument/2006/relationships" xmlns:p="http://schemas.openxmlformats.org/presentationml/2006/main">
-  <p:cSld>
-    <p:spTree>
-      <p:nvGrpSpPr>
-        <p:cNvPr id="1" name=""/>
-        <p:cNvGrpSpPr/>
-        <p:nvPr/>
-      </p:nvGrpSpPr>
-      <p:grpSpPr>
-        <a:xfrm>
-          <a:off x="0" y="0"/>
-          <a:ext cx="0" cy="0"/>
-          <a:chOff x="0" y="0"/>
-          <a:chExt cx="0" cy="0"/>
-        </a:xfrm>
-      </p:grpSpPr>
-      <p:sp>
-        <p:nvSpPr>
-          <p:cNvPr id="2" name="Title 1">
-            <a:extLst>
-              <a:ext uri="{FF2B5EF4-FFF2-40B4-BE49-F238E27FC236}">
-                <a16:creationId xmlns:a16="http://schemas.microsoft.com/office/drawing/2014/main" id="{0AFF2694-842C-7D49-8743-E67E62B7CE29}"/>
-              </a:ext>
-            </a:extLst>
-          </p:cNvPr>
-          <p:cNvSpPr>
-            <a:spLocks noGrp="1"/>
-          </p:cNvSpPr>
-          <p:nvPr>
-            <p:ph type="title"/>
-          </p:nvPr>
-        </p:nvSpPr>
-        <p:spPr/>
-        <p:txBody>
-          <a:bodyPr/>
-          <a:lstStyle/>
-          <a:p>
-            <a:r>
-              <a:rPr lang="en-US" dirty="0"/>
-              <a:t>What is the problem – 60 seconds</a:t>
+              <a:t>So what is being done? - 90 seconds</a:t>
             </a:r>
           </a:p>
         </p:txBody>
@@ -3979,37 +3843,34 @@
           </a:p>
           <a:p>
             <a:r>
-              <a:rPr lang="en-US" dirty="0"/>
-              <a:t>Script along the lines of “What is the problem being faced by online learners, here is X member from </a:t>
-            </a:r>
-            <a:r>
-              <a:rPr lang="en-US" dirty="0" err="1"/>
-              <a:t>prosight</a:t>
-            </a:r>
-            <a:r>
-              <a:rPr lang="en-US" dirty="0"/>
-              <a:t>”</a:t>
-            </a:r>
-          </a:p>
-          <a:p>
+              <a:rPr lang="en-AU" dirty="0"/>
+              <a:t>Pitch </a:t>
+            </a:r>
+            <a:r>
+              <a:rPr lang="en-AU" dirty="0" err="1"/>
+              <a:t>Prosight’s</a:t>
+            </a:r>
+            <a:r>
+              <a:rPr lang="en-AU" dirty="0"/>
+              <a:t> study tool as the answer, why it fills the gap available and how amazing it is</a:t>
+            </a:r>
+          </a:p>
+          <a:p>
+            <a:endParaRPr lang="en-AU" dirty="0"/>
+          </a:p>
+          <a:p>
+            <a:r>
+              <a:rPr lang="en-AU" dirty="0"/>
+              <a:t>How does it work, explain how students can use it.</a:t>
+            </a:r>
             <a:endParaRPr lang="en-US" dirty="0"/>
-          </a:p>
-          <a:p>
-            <a:r>
-              <a:rPr lang="en-US" dirty="0" err="1"/>
-              <a:t>Prosight</a:t>
-            </a:r>
-            <a:r>
-              <a:rPr lang="en-US" dirty="0"/>
-              <a:t> member X to illustrate the challenges of online learning</a:t>
-            </a:r>
           </a:p>
         </p:txBody>
       </p:sp>
     </p:spTree>
     <p:extLst>
       <p:ext uri="{BB962C8B-B14F-4D97-AF65-F5344CB8AC3E}">
-        <p14:creationId xmlns:p14="http://schemas.microsoft.com/office/powerpoint/2010/main" val="2716251402"/>
+        <p14:creationId xmlns:p14="http://schemas.microsoft.com/office/powerpoint/2010/main" val="3604171044"/>
       </p:ext>
     </p:extLst>
   </p:cSld>
@@ -4019,7 +3880,7 @@
 </p:sld>
 </file>
 
-<file path=ppt/slides/slide5.xml><?xml version="1.0" encoding="utf-8"?>
+<file path=ppt/slides/slide12.xml><?xml version="1.0" encoding="utf-8"?>
 <p:sld xmlns:a="http://schemas.openxmlformats.org/drawingml/2006/main" xmlns:r="http://schemas.openxmlformats.org/officeDocument/2006/relationships" xmlns:p="http://schemas.openxmlformats.org/presentationml/2006/main">
   <p:cSld>
     <p:spTree>
@@ -4041,6 +3902,206 @@
           <p:cNvPr id="2" name="Title 1">
             <a:extLst>
               <a:ext uri="{FF2B5EF4-FFF2-40B4-BE49-F238E27FC236}">
+                <a16:creationId xmlns:a16="http://schemas.microsoft.com/office/drawing/2014/main" id="{B9395550-3173-2F44-A17F-ECB8F46226BF}"/>
+              </a:ext>
+            </a:extLst>
+          </p:cNvPr>
+          <p:cNvSpPr>
+            <a:spLocks noGrp="1"/>
+          </p:cNvSpPr>
+          <p:nvPr>
+            <p:ph type="title"/>
+          </p:nvPr>
+        </p:nvSpPr>
+        <p:spPr/>
+        <p:txBody>
+          <a:bodyPr/>
+          <a:lstStyle/>
+          <a:p>
+            <a:r>
+              <a:rPr lang="en-US" dirty="0"/>
+              <a:t>So what is being done? – Script - XXXX</a:t>
+            </a:r>
+          </a:p>
+        </p:txBody>
+      </p:sp>
+      <p:sp>
+        <p:nvSpPr>
+          <p:cNvPr id="3" name="Content Placeholder 2">
+            <a:extLst>
+              <a:ext uri="{FF2B5EF4-FFF2-40B4-BE49-F238E27FC236}">
+                <a16:creationId xmlns:a16="http://schemas.microsoft.com/office/drawing/2014/main" id="{3EBFF5F1-1C5E-504D-BF65-3ECE78597D6D}"/>
+              </a:ext>
+            </a:extLst>
+          </p:cNvPr>
+          <p:cNvSpPr>
+            <a:spLocks noGrp="1"/>
+          </p:cNvSpPr>
+          <p:nvPr>
+            <p:ph idx="1"/>
+          </p:nvPr>
+        </p:nvSpPr>
+        <p:spPr/>
+        <p:txBody>
+          <a:bodyPr>
+            <a:normAutofit/>
+          </a:bodyPr>
+          <a:lstStyle/>
+          <a:p>
+            <a:r>
+              <a:rPr lang="en-AU" dirty="0"/>
+              <a:t>Right now, there isn’t much, this is why we have created our platform etc.  </a:t>
+            </a:r>
+          </a:p>
+          <a:p>
+            <a:endParaRPr lang="en-AU" dirty="0"/>
+          </a:p>
+          <a:p>
+            <a:r>
+              <a:rPr lang="en-AU" dirty="0"/>
+              <a:t>Describe how it works, what it does, why you’d use, how its very simple, free etc</a:t>
+            </a:r>
+          </a:p>
+          <a:p>
+            <a:endParaRPr lang="en-US" dirty="0"/>
+          </a:p>
+        </p:txBody>
+      </p:sp>
+    </p:spTree>
+    <p:extLst>
+      <p:ext uri="{BB962C8B-B14F-4D97-AF65-F5344CB8AC3E}">
+        <p14:creationId xmlns:p14="http://schemas.microsoft.com/office/powerpoint/2010/main" val="1159949598"/>
+      </p:ext>
+    </p:extLst>
+  </p:cSld>
+  <p:clrMapOvr>
+    <a:masterClrMapping/>
+  </p:clrMapOvr>
+</p:sld>
+</file>
+
+<file path=ppt/slides/slide13.xml><?xml version="1.0" encoding="utf-8"?>
+<p:sld xmlns:a="http://schemas.openxmlformats.org/drawingml/2006/main" xmlns:r="http://schemas.openxmlformats.org/officeDocument/2006/relationships" xmlns:p="http://schemas.openxmlformats.org/presentationml/2006/main">
+  <p:cSld>
+    <p:spTree>
+      <p:nvGrpSpPr>
+        <p:cNvPr id="1" name=""/>
+        <p:cNvGrpSpPr/>
+        <p:nvPr/>
+      </p:nvGrpSpPr>
+      <p:grpSpPr>
+        <a:xfrm>
+          <a:off x="0" y="0"/>
+          <a:ext cx="0" cy="0"/>
+          <a:chOff x="0" y="0"/>
+          <a:chExt cx="0" cy="0"/>
+        </a:xfrm>
+      </p:grpSpPr>
+      <p:sp>
+        <p:nvSpPr>
+          <p:cNvPr id="2" name="Title 1">
+            <a:extLst>
+              <a:ext uri="{FF2B5EF4-FFF2-40B4-BE49-F238E27FC236}">
+                <a16:creationId xmlns:a16="http://schemas.microsoft.com/office/drawing/2014/main" id="{B9395550-3173-2F44-A17F-ECB8F46226BF}"/>
+              </a:ext>
+            </a:extLst>
+          </p:cNvPr>
+          <p:cNvSpPr>
+            <a:spLocks noGrp="1"/>
+          </p:cNvSpPr>
+          <p:nvPr>
+            <p:ph type="title"/>
+          </p:nvPr>
+        </p:nvSpPr>
+        <p:spPr/>
+        <p:txBody>
+          <a:bodyPr/>
+          <a:lstStyle/>
+          <a:p>
+            <a:r>
+              <a:rPr lang="en-US" dirty="0"/>
+              <a:t>So what is being done? – Script - Alex</a:t>
+            </a:r>
+          </a:p>
+        </p:txBody>
+      </p:sp>
+      <p:sp>
+        <p:nvSpPr>
+          <p:cNvPr id="3" name="Content Placeholder 2">
+            <a:extLst>
+              <a:ext uri="{FF2B5EF4-FFF2-40B4-BE49-F238E27FC236}">
+                <a16:creationId xmlns:a16="http://schemas.microsoft.com/office/drawing/2014/main" id="{3EBFF5F1-1C5E-504D-BF65-3ECE78597D6D}"/>
+              </a:ext>
+            </a:extLst>
+          </p:cNvPr>
+          <p:cNvSpPr>
+            <a:spLocks noGrp="1"/>
+          </p:cNvSpPr>
+          <p:nvPr>
+            <p:ph idx="1"/>
+          </p:nvPr>
+        </p:nvSpPr>
+        <p:spPr/>
+        <p:txBody>
+          <a:bodyPr>
+            <a:normAutofit/>
+          </a:bodyPr>
+          <a:lstStyle/>
+          <a:p>
+            <a:r>
+              <a:rPr lang="en-AU" dirty="0"/>
+              <a:t>That sounds great!  Its sounds like you’ve really got a good grasp on what the issues are and you’ve got an answer that can really help students here achieve their potential!</a:t>
+            </a:r>
+          </a:p>
+          <a:p>
+            <a:endParaRPr lang="en-AU" dirty="0"/>
+          </a:p>
+          <a:p>
+            <a:r>
+              <a:rPr lang="en-AU" dirty="0"/>
+              <a:t>You said this is a free service, that sounds great.  What motivated you as a team to go ahead and start to create this?  XXXX tell me a little about that?</a:t>
+            </a:r>
+          </a:p>
+          <a:p>
+            <a:endParaRPr lang="en-US" dirty="0"/>
+          </a:p>
+        </p:txBody>
+      </p:sp>
+    </p:spTree>
+    <p:extLst>
+      <p:ext uri="{BB962C8B-B14F-4D97-AF65-F5344CB8AC3E}">
+        <p14:creationId xmlns:p14="http://schemas.microsoft.com/office/powerpoint/2010/main" val="1026001083"/>
+      </p:ext>
+    </p:extLst>
+  </p:cSld>
+  <p:clrMapOvr>
+    <a:masterClrMapping/>
+  </p:clrMapOvr>
+</p:sld>
+</file>
+
+<file path=ppt/slides/slide14.xml><?xml version="1.0" encoding="utf-8"?>
+<p:sld xmlns:a="http://schemas.openxmlformats.org/drawingml/2006/main" xmlns:r="http://schemas.openxmlformats.org/officeDocument/2006/relationships" xmlns:p="http://schemas.openxmlformats.org/presentationml/2006/main">
+  <p:cSld>
+    <p:spTree>
+      <p:nvGrpSpPr>
+        <p:cNvPr id="1" name=""/>
+        <p:cNvGrpSpPr/>
+        <p:nvPr/>
+      </p:nvGrpSpPr>
+      <p:grpSpPr>
+        <a:xfrm>
+          <a:off x="0" y="0"/>
+          <a:ext cx="0" cy="0"/>
+          <a:chOff x="0" y="0"/>
+          <a:chExt cx="0" cy="0"/>
+        </a:xfrm>
+      </p:grpSpPr>
+      <p:sp>
+        <p:nvSpPr>
+          <p:cNvPr id="2" name="Title 1">
+            <a:extLst>
+              <a:ext uri="{FF2B5EF4-FFF2-40B4-BE49-F238E27FC236}">
                 <a16:creationId xmlns:a16="http://schemas.microsoft.com/office/drawing/2014/main" id="{0AFF2694-842C-7D49-8743-E67E62B7CE29}"/>
               </a:ext>
             </a:extLst>
@@ -4059,7 +4120,7 @@
           <a:p>
             <a:r>
               <a:rPr lang="en-US" dirty="0"/>
-              <a:t>What steps are we taking as Australians? – 60 seconds</a:t>
+              <a:t>Why is the team doing this ?- 30 seconds</a:t>
             </a:r>
           </a:p>
         </p:txBody>
@@ -4295,16 +4356,31 @@
           </a:p>
           <a:p>
             <a:r>
-              <a:rPr lang="en-US" dirty="0"/>
-              <a:t>Illustrate the points that there are solutions out there, however none of them are really understanding the needs of the student and are bespoke</a:t>
-            </a:r>
+              <a:rPr lang="en-AU" dirty="0"/>
+              <a:t>Explain our motivations</a:t>
+            </a:r>
+          </a:p>
+          <a:p>
+            <a:endParaRPr lang="en-AU" dirty="0"/>
+          </a:p>
+          <a:p>
+            <a:r>
+              <a:rPr lang="en-AU" dirty="0"/>
+              <a:t>How it can change lives</a:t>
+            </a:r>
+          </a:p>
+          <a:p>
+            <a:endParaRPr lang="en-AU" dirty="0"/>
+          </a:p>
+          <a:p>
+            <a:endParaRPr lang="en-US" dirty="0"/>
           </a:p>
         </p:txBody>
       </p:sp>
     </p:spTree>
     <p:extLst>
       <p:ext uri="{BB962C8B-B14F-4D97-AF65-F5344CB8AC3E}">
-        <p14:creationId xmlns:p14="http://schemas.microsoft.com/office/powerpoint/2010/main" val="2168259597"/>
+        <p14:creationId xmlns:p14="http://schemas.microsoft.com/office/powerpoint/2010/main" val="1057856342"/>
       </p:ext>
     </p:extLst>
   </p:cSld>
@@ -4314,7 +4390,7 @@
 </p:sld>
 </file>
 
-<file path=ppt/slides/slide6.xml><?xml version="1.0" encoding="utf-8"?>
+<file path=ppt/slides/slide15.xml><?xml version="1.0" encoding="utf-8"?>
 <p:sld xmlns:a="http://schemas.openxmlformats.org/drawingml/2006/main" xmlns:r="http://schemas.openxmlformats.org/officeDocument/2006/relationships" xmlns:p="http://schemas.openxmlformats.org/presentationml/2006/main">
   <p:cSld>
     <p:spTree>
@@ -4336,6 +4412,194 @@
           <p:cNvPr id="2" name="Title 1">
             <a:extLst>
               <a:ext uri="{FF2B5EF4-FFF2-40B4-BE49-F238E27FC236}">
+                <a16:creationId xmlns:a16="http://schemas.microsoft.com/office/drawing/2014/main" id="{B9395550-3173-2F44-A17F-ECB8F46226BF}"/>
+              </a:ext>
+            </a:extLst>
+          </p:cNvPr>
+          <p:cNvSpPr>
+            <a:spLocks noGrp="1"/>
+          </p:cNvSpPr>
+          <p:nvPr>
+            <p:ph type="title"/>
+          </p:nvPr>
+        </p:nvSpPr>
+        <p:spPr/>
+        <p:txBody>
+          <a:bodyPr/>
+          <a:lstStyle/>
+          <a:p>
+            <a:r>
+              <a:rPr lang="en-US" dirty="0"/>
+              <a:t>Why is the team doing this? – Script - XXXX</a:t>
+            </a:r>
+          </a:p>
+        </p:txBody>
+      </p:sp>
+      <p:sp>
+        <p:nvSpPr>
+          <p:cNvPr id="3" name="Content Placeholder 2">
+            <a:extLst>
+              <a:ext uri="{FF2B5EF4-FFF2-40B4-BE49-F238E27FC236}">
+                <a16:creationId xmlns:a16="http://schemas.microsoft.com/office/drawing/2014/main" id="{3EBFF5F1-1C5E-504D-BF65-3ECE78597D6D}"/>
+              </a:ext>
+            </a:extLst>
+          </p:cNvPr>
+          <p:cNvSpPr>
+            <a:spLocks noGrp="1"/>
+          </p:cNvSpPr>
+          <p:nvPr>
+            <p:ph idx="1"/>
+          </p:nvPr>
+        </p:nvSpPr>
+        <p:spPr/>
+        <p:txBody>
+          <a:bodyPr>
+            <a:normAutofit/>
+          </a:bodyPr>
+          <a:lstStyle/>
+          <a:p>
+            <a:r>
+              <a:rPr lang="en-AU" dirty="0"/>
+              <a:t>Talk about the motivations for doing this, why we chose this as a project.</a:t>
+            </a:r>
+          </a:p>
+          <a:p>
+            <a:endParaRPr lang="en-AU" dirty="0"/>
+          </a:p>
+          <a:p>
+            <a:endParaRPr lang="en-AU" dirty="0"/>
+          </a:p>
+          <a:p>
+            <a:endParaRPr lang="en-US" dirty="0"/>
+          </a:p>
+        </p:txBody>
+      </p:sp>
+    </p:spTree>
+    <p:extLst>
+      <p:ext uri="{BB962C8B-B14F-4D97-AF65-F5344CB8AC3E}">
+        <p14:creationId xmlns:p14="http://schemas.microsoft.com/office/powerpoint/2010/main" val="3504769044"/>
+      </p:ext>
+    </p:extLst>
+  </p:cSld>
+  <p:clrMapOvr>
+    <a:masterClrMapping/>
+  </p:clrMapOvr>
+</p:sld>
+</file>
+
+<file path=ppt/slides/slide16.xml><?xml version="1.0" encoding="utf-8"?>
+<p:sld xmlns:a="http://schemas.openxmlformats.org/drawingml/2006/main" xmlns:r="http://schemas.openxmlformats.org/officeDocument/2006/relationships" xmlns:p="http://schemas.openxmlformats.org/presentationml/2006/main">
+  <p:cSld>
+    <p:spTree>
+      <p:nvGrpSpPr>
+        <p:cNvPr id="1" name=""/>
+        <p:cNvGrpSpPr/>
+        <p:nvPr/>
+      </p:nvGrpSpPr>
+      <p:grpSpPr>
+        <a:xfrm>
+          <a:off x="0" y="0"/>
+          <a:ext cx="0" cy="0"/>
+          <a:chOff x="0" y="0"/>
+          <a:chExt cx="0" cy="0"/>
+        </a:xfrm>
+      </p:grpSpPr>
+      <p:sp>
+        <p:nvSpPr>
+          <p:cNvPr id="2" name="Title 1">
+            <a:extLst>
+              <a:ext uri="{FF2B5EF4-FFF2-40B4-BE49-F238E27FC236}">
+                <a16:creationId xmlns:a16="http://schemas.microsoft.com/office/drawing/2014/main" id="{B9395550-3173-2F44-A17F-ECB8F46226BF}"/>
+              </a:ext>
+            </a:extLst>
+          </p:cNvPr>
+          <p:cNvSpPr>
+            <a:spLocks noGrp="1"/>
+          </p:cNvSpPr>
+          <p:nvPr>
+            <p:ph type="title"/>
+          </p:nvPr>
+        </p:nvSpPr>
+        <p:spPr/>
+        <p:txBody>
+          <a:bodyPr/>
+          <a:lstStyle/>
+          <a:p>
+            <a:r>
+              <a:rPr lang="en-US" dirty="0"/>
+              <a:t>So what is being done? – Script - Alex</a:t>
+            </a:r>
+          </a:p>
+        </p:txBody>
+      </p:sp>
+      <p:sp>
+        <p:nvSpPr>
+          <p:cNvPr id="3" name="Content Placeholder 2">
+            <a:extLst>
+              <a:ext uri="{FF2B5EF4-FFF2-40B4-BE49-F238E27FC236}">
+                <a16:creationId xmlns:a16="http://schemas.microsoft.com/office/drawing/2014/main" id="{3EBFF5F1-1C5E-504D-BF65-3ECE78597D6D}"/>
+              </a:ext>
+            </a:extLst>
+          </p:cNvPr>
+          <p:cNvSpPr>
+            <a:spLocks noGrp="1"/>
+          </p:cNvSpPr>
+          <p:nvPr>
+            <p:ph idx="1"/>
+          </p:nvPr>
+        </p:nvSpPr>
+        <p:spPr/>
+        <p:txBody>
+          <a:bodyPr>
+            <a:normAutofit/>
+          </a:bodyPr>
+          <a:lstStyle/>
+          <a:p>
+            <a:r>
+              <a:rPr lang="en-AU" dirty="0"/>
+              <a:t>Brilliant, you’re doing great work, how can we find out more?</a:t>
+            </a:r>
+          </a:p>
+          <a:p>
+            <a:endParaRPr lang="en-US" dirty="0"/>
+          </a:p>
+        </p:txBody>
+      </p:sp>
+    </p:spTree>
+    <p:extLst>
+      <p:ext uri="{BB962C8B-B14F-4D97-AF65-F5344CB8AC3E}">
+        <p14:creationId xmlns:p14="http://schemas.microsoft.com/office/powerpoint/2010/main" val="1665674616"/>
+      </p:ext>
+    </p:extLst>
+  </p:cSld>
+  <p:clrMapOvr>
+    <a:masterClrMapping/>
+  </p:clrMapOvr>
+</p:sld>
+</file>
+
+<file path=ppt/slides/slide17.xml><?xml version="1.0" encoding="utf-8"?>
+<p:sld xmlns:a="http://schemas.openxmlformats.org/drawingml/2006/main" xmlns:r="http://schemas.openxmlformats.org/officeDocument/2006/relationships" xmlns:p="http://schemas.openxmlformats.org/presentationml/2006/main">
+  <p:cSld>
+    <p:spTree>
+      <p:nvGrpSpPr>
+        <p:cNvPr id="1" name=""/>
+        <p:cNvGrpSpPr/>
+        <p:nvPr/>
+      </p:nvGrpSpPr>
+      <p:grpSpPr>
+        <a:xfrm>
+          <a:off x="0" y="0"/>
+          <a:ext cx="0" cy="0"/>
+          <a:chOff x="0" y="0"/>
+          <a:chExt cx="0" cy="0"/>
+        </a:xfrm>
+      </p:grpSpPr>
+      <p:sp>
+        <p:nvSpPr>
+          <p:cNvPr id="2" name="Title 1">
+            <a:extLst>
+              <a:ext uri="{FF2B5EF4-FFF2-40B4-BE49-F238E27FC236}">
                 <a16:creationId xmlns:a16="http://schemas.microsoft.com/office/drawing/2014/main" id="{0AFF2694-842C-7D49-8743-E67E62B7CE29}"/>
               </a:ext>
             </a:extLst>
@@ -4354,7 +4618,7 @@
           <a:p>
             <a:r>
               <a:rPr lang="en-US" dirty="0"/>
-              <a:t>So what is being done? - 90 seconds</a:t>
+              <a:t>How can I find out more? 30 seconds</a:t>
             </a:r>
           </a:p>
         </p:txBody>
@@ -4591,25 +4855,30 @@
           <a:p>
             <a:r>
               <a:rPr lang="en-AU" dirty="0"/>
-              <a:t>Pitch </a:t>
-            </a:r>
-            <a:r>
-              <a:rPr lang="en-AU" dirty="0" err="1"/>
-              <a:t>Prosight’s</a:t>
-            </a:r>
+              <a:t>Cover off cost (free)</a:t>
+            </a:r>
+          </a:p>
+          <a:p>
+            <a:endParaRPr lang="en-AU" dirty="0"/>
+          </a:p>
+          <a:p>
             <a:r>
               <a:rPr lang="en-AU" dirty="0"/>
-              <a:t> study tool as the answer, why it fills the gap available and how amazing it is</a:t>
+              <a:t>Cover off that it will be launching soon for Australia</a:t>
+            </a:r>
+            <a:r>
+              <a:rPr lang="en-AU"/>
+              <a:t>, later </a:t>
+            </a:r>
+            <a:r>
+              <a:rPr lang="en-AU" dirty="0"/>
+              <a:t>in the rest of the world</a:t>
             </a:r>
           </a:p>
           <a:p>
             <a:endParaRPr lang="en-AU" dirty="0"/>
           </a:p>
           <a:p>
-            <a:r>
-              <a:rPr lang="en-AU" dirty="0"/>
-              <a:t>How does it work, explain how students can use it.</a:t>
-            </a:r>
             <a:endParaRPr lang="en-US" dirty="0"/>
           </a:p>
         </p:txBody>
@@ -4617,7 +4886,7 @@
     </p:spTree>
     <p:extLst>
       <p:ext uri="{BB962C8B-B14F-4D97-AF65-F5344CB8AC3E}">
-        <p14:creationId xmlns:p14="http://schemas.microsoft.com/office/powerpoint/2010/main" val="3604171044"/>
+        <p14:creationId xmlns:p14="http://schemas.microsoft.com/office/powerpoint/2010/main" val="1265038317"/>
       </p:ext>
     </p:extLst>
   </p:cSld>
@@ -4627,7 +4896,7 @@
 </p:sld>
 </file>
 
-<file path=ppt/slides/slide7.xml><?xml version="1.0" encoding="utf-8"?>
+<file path=ppt/slides/slide18.xml><?xml version="1.0" encoding="utf-8"?>
 <p:sld xmlns:a="http://schemas.openxmlformats.org/drawingml/2006/main" xmlns:r="http://schemas.openxmlformats.org/officeDocument/2006/relationships" xmlns:p="http://schemas.openxmlformats.org/presentationml/2006/main">
   <p:cSld>
     <p:spTree>
@@ -4649,6 +4918,679 @@
           <p:cNvPr id="2" name="Title 1">
             <a:extLst>
               <a:ext uri="{FF2B5EF4-FFF2-40B4-BE49-F238E27FC236}">
+                <a16:creationId xmlns:a16="http://schemas.microsoft.com/office/drawing/2014/main" id="{B9395550-3173-2F44-A17F-ECB8F46226BF}"/>
+              </a:ext>
+            </a:extLst>
+          </p:cNvPr>
+          <p:cNvSpPr>
+            <a:spLocks noGrp="1"/>
+          </p:cNvSpPr>
+          <p:nvPr>
+            <p:ph type="title"/>
+          </p:nvPr>
+        </p:nvSpPr>
+        <p:spPr/>
+        <p:txBody>
+          <a:bodyPr/>
+          <a:lstStyle/>
+          <a:p>
+            <a:r>
+              <a:rPr lang="en-US" dirty="0"/>
+              <a:t>How can I find out more? – Script - XXXX</a:t>
+            </a:r>
+          </a:p>
+        </p:txBody>
+      </p:sp>
+      <p:sp>
+        <p:nvSpPr>
+          <p:cNvPr id="3" name="Content Placeholder 2">
+            <a:extLst>
+              <a:ext uri="{FF2B5EF4-FFF2-40B4-BE49-F238E27FC236}">
+                <a16:creationId xmlns:a16="http://schemas.microsoft.com/office/drawing/2014/main" id="{3EBFF5F1-1C5E-504D-BF65-3ECE78597D6D}"/>
+              </a:ext>
+            </a:extLst>
+          </p:cNvPr>
+          <p:cNvSpPr>
+            <a:spLocks noGrp="1"/>
+          </p:cNvSpPr>
+          <p:nvPr>
+            <p:ph idx="1"/>
+          </p:nvPr>
+        </p:nvSpPr>
+        <p:spPr/>
+        <p:txBody>
+          <a:bodyPr>
+            <a:normAutofit/>
+          </a:bodyPr>
+          <a:lstStyle/>
+          <a:p>
+            <a:r>
+              <a:rPr lang="en-AU" dirty="0"/>
+              <a:t>We’ll be launching soon, keep an eye out for our website launch</a:t>
+            </a:r>
+          </a:p>
+          <a:p>
+            <a:endParaRPr lang="en-US" dirty="0"/>
+          </a:p>
+        </p:txBody>
+      </p:sp>
+    </p:spTree>
+    <p:extLst>
+      <p:ext uri="{BB962C8B-B14F-4D97-AF65-F5344CB8AC3E}">
+        <p14:creationId xmlns:p14="http://schemas.microsoft.com/office/powerpoint/2010/main" val="3278186133"/>
+      </p:ext>
+    </p:extLst>
+  </p:cSld>
+  <p:clrMapOvr>
+    <a:masterClrMapping/>
+  </p:clrMapOvr>
+</p:sld>
+</file>
+
+<file path=ppt/slides/slide19.xml><?xml version="1.0" encoding="utf-8"?>
+<p:sld xmlns:a="http://schemas.openxmlformats.org/drawingml/2006/main" xmlns:r="http://schemas.openxmlformats.org/officeDocument/2006/relationships" xmlns:p="http://schemas.openxmlformats.org/presentationml/2006/main">
+  <p:cSld>
+    <p:spTree>
+      <p:nvGrpSpPr>
+        <p:cNvPr id="1" name=""/>
+        <p:cNvGrpSpPr/>
+        <p:nvPr/>
+      </p:nvGrpSpPr>
+      <p:grpSpPr>
+        <a:xfrm>
+          <a:off x="0" y="0"/>
+          <a:ext cx="0" cy="0"/>
+          <a:chOff x="0" y="0"/>
+          <a:chExt cx="0" cy="0"/>
+        </a:xfrm>
+      </p:grpSpPr>
+      <p:sp>
+        <p:nvSpPr>
+          <p:cNvPr id="2" name="Title 1">
+            <a:extLst>
+              <a:ext uri="{FF2B5EF4-FFF2-40B4-BE49-F238E27FC236}">
+                <a16:creationId xmlns:a16="http://schemas.microsoft.com/office/drawing/2014/main" id="{B9395550-3173-2F44-A17F-ECB8F46226BF}"/>
+              </a:ext>
+            </a:extLst>
+          </p:cNvPr>
+          <p:cNvSpPr>
+            <a:spLocks noGrp="1"/>
+          </p:cNvSpPr>
+          <p:nvPr>
+            <p:ph type="title"/>
+          </p:nvPr>
+        </p:nvSpPr>
+        <p:spPr/>
+        <p:txBody>
+          <a:bodyPr/>
+          <a:lstStyle/>
+          <a:p>
+            <a:r>
+              <a:rPr lang="en-US" dirty="0"/>
+              <a:t>How can I find out more? – Script - Alex</a:t>
+            </a:r>
+          </a:p>
+        </p:txBody>
+      </p:sp>
+      <p:sp>
+        <p:nvSpPr>
+          <p:cNvPr id="3" name="Content Placeholder 2">
+            <a:extLst>
+              <a:ext uri="{FF2B5EF4-FFF2-40B4-BE49-F238E27FC236}">
+                <a16:creationId xmlns:a16="http://schemas.microsoft.com/office/drawing/2014/main" id="{3EBFF5F1-1C5E-504D-BF65-3ECE78597D6D}"/>
+              </a:ext>
+            </a:extLst>
+          </p:cNvPr>
+          <p:cNvSpPr>
+            <a:spLocks noGrp="1"/>
+          </p:cNvSpPr>
+          <p:nvPr>
+            <p:ph idx="1"/>
+          </p:nvPr>
+        </p:nvSpPr>
+        <p:spPr/>
+        <p:txBody>
+          <a:bodyPr>
+            <a:normAutofit/>
+          </a:bodyPr>
+          <a:lstStyle/>
+          <a:p>
+            <a:r>
+              <a:rPr lang="en-AU" dirty="0"/>
+              <a:t>Definitely keep us up to date, we’ll look forward to having you back on to talk about the success!</a:t>
+            </a:r>
+          </a:p>
+          <a:p>
+            <a:endParaRPr lang="en-AU" dirty="0"/>
+          </a:p>
+          <a:p>
+            <a:r>
+              <a:rPr lang="en-AU" dirty="0"/>
+              <a:t>Thanks everyone for joining us today, its been a real insight into some of the innovation coming into the market.</a:t>
+            </a:r>
+          </a:p>
+          <a:p>
+            <a:endParaRPr lang="en-AU" dirty="0"/>
+          </a:p>
+          <a:p>
+            <a:r>
+              <a:rPr lang="en-AU" dirty="0"/>
+              <a:t>You can join us next week for our education segment where we’ll be talking about why do magicians do so well in school?  Is it because they are good at trick questions?  Join us to find out.</a:t>
+            </a:r>
+          </a:p>
+          <a:p>
+            <a:endParaRPr lang="en-US" dirty="0"/>
+          </a:p>
+        </p:txBody>
+      </p:sp>
+    </p:spTree>
+    <p:extLst>
+      <p:ext uri="{BB962C8B-B14F-4D97-AF65-F5344CB8AC3E}">
+        <p14:creationId xmlns:p14="http://schemas.microsoft.com/office/powerpoint/2010/main" val="1216723666"/>
+      </p:ext>
+    </p:extLst>
+  </p:cSld>
+  <p:clrMapOvr>
+    <a:masterClrMapping/>
+  </p:clrMapOvr>
+</p:sld>
+</file>
+
+<file path=ppt/slides/slide2.xml><?xml version="1.0" encoding="utf-8"?>
+<p:sld xmlns:a="http://schemas.openxmlformats.org/drawingml/2006/main" xmlns:r="http://schemas.openxmlformats.org/officeDocument/2006/relationships" xmlns:p="http://schemas.openxmlformats.org/presentationml/2006/main">
+  <p:cSld>
+    <p:spTree>
+      <p:nvGrpSpPr>
+        <p:cNvPr id="1" name=""/>
+        <p:cNvGrpSpPr/>
+        <p:nvPr/>
+      </p:nvGrpSpPr>
+      <p:grpSpPr>
+        <a:xfrm>
+          <a:off x="0" y="0"/>
+          <a:ext cx="0" cy="0"/>
+          <a:chOff x="0" y="0"/>
+          <a:chExt cx="0" cy="0"/>
+        </a:xfrm>
+      </p:grpSpPr>
+      <p:sp>
+        <p:nvSpPr>
+          <p:cNvPr id="2" name="Title 1">
+            <a:extLst>
+              <a:ext uri="{FF2B5EF4-FFF2-40B4-BE49-F238E27FC236}">
+                <a16:creationId xmlns:a16="http://schemas.microsoft.com/office/drawing/2014/main" id="{AF6B02FC-3501-2E4D-ACF5-E7CC637787FF}"/>
+              </a:ext>
+            </a:extLst>
+          </p:cNvPr>
+          <p:cNvSpPr>
+            <a:spLocks noGrp="1"/>
+          </p:cNvSpPr>
+          <p:nvPr>
+            <p:ph type="title"/>
+          </p:nvPr>
+        </p:nvSpPr>
+        <p:spPr/>
+        <p:txBody>
+          <a:bodyPr/>
+          <a:lstStyle/>
+          <a:p>
+            <a:r>
+              <a:rPr lang="en-US" dirty="0"/>
+              <a:t>Key points</a:t>
+            </a:r>
+          </a:p>
+        </p:txBody>
+      </p:sp>
+      <p:sp>
+        <p:nvSpPr>
+          <p:cNvPr id="3" name="Content Placeholder 2">
+            <a:extLst>
+              <a:ext uri="{FF2B5EF4-FFF2-40B4-BE49-F238E27FC236}">
+                <a16:creationId xmlns:a16="http://schemas.microsoft.com/office/drawing/2014/main" id="{84048969-D2EF-9841-8E0B-112A49E0E98F}"/>
+              </a:ext>
+            </a:extLst>
+          </p:cNvPr>
+          <p:cNvSpPr>
+            <a:spLocks noGrp="1"/>
+          </p:cNvSpPr>
+          <p:nvPr>
+            <p:ph idx="1"/>
+          </p:nvPr>
+        </p:nvSpPr>
+        <p:spPr/>
+        <p:txBody>
+          <a:bodyPr/>
+          <a:lstStyle/>
+          <a:p>
+            <a:r>
+              <a:rPr lang="en-US" dirty="0"/>
+              <a:t>Include </a:t>
+            </a:r>
+            <a:r>
+              <a:rPr lang="en-US" dirty="0" err="1"/>
+              <a:t>colour</a:t>
+            </a:r>
+            <a:r>
+              <a:rPr lang="en-US" dirty="0"/>
+              <a:t> and graphics</a:t>
+            </a:r>
+          </a:p>
+          <a:p>
+            <a:endParaRPr lang="en-US" dirty="0"/>
+          </a:p>
+          <a:p>
+            <a:r>
+              <a:rPr lang="en-US" dirty="0"/>
+              <a:t>Intro</a:t>
+            </a:r>
+          </a:p>
+          <a:p>
+            <a:r>
+              <a:rPr lang="en-US" dirty="0"/>
+              <a:t>Structure, logical progression</a:t>
+            </a:r>
+          </a:p>
+          <a:p>
+            <a:r>
+              <a:rPr lang="en-US" dirty="0"/>
+              <a:t>Be engaging</a:t>
+            </a:r>
+          </a:p>
+          <a:p>
+            <a:endParaRPr lang="en-US" dirty="0"/>
+          </a:p>
+          <a:p>
+            <a:r>
+              <a:rPr lang="en-US" dirty="0"/>
+              <a:t>Style – as per info</a:t>
+            </a:r>
+          </a:p>
+          <a:p>
+            <a:endParaRPr lang="en-US" dirty="0"/>
+          </a:p>
+        </p:txBody>
+      </p:sp>
+    </p:spTree>
+    <p:extLst>
+      <p:ext uri="{BB962C8B-B14F-4D97-AF65-F5344CB8AC3E}">
+        <p14:creationId xmlns:p14="http://schemas.microsoft.com/office/powerpoint/2010/main" val="2113874010"/>
+      </p:ext>
+    </p:extLst>
+  </p:cSld>
+  <p:clrMapOvr>
+    <a:masterClrMapping/>
+  </p:clrMapOvr>
+</p:sld>
+</file>
+
+<file path=ppt/slides/slide20.xml><?xml version="1.0" encoding="utf-8"?>
+<p:sld xmlns:a="http://schemas.openxmlformats.org/drawingml/2006/main" xmlns:r="http://schemas.openxmlformats.org/officeDocument/2006/relationships" xmlns:p="http://schemas.openxmlformats.org/presentationml/2006/main">
+  <p:cSld>
+    <p:spTree>
+      <p:nvGrpSpPr>
+        <p:cNvPr id="1" name=""/>
+        <p:cNvGrpSpPr/>
+        <p:nvPr/>
+      </p:nvGrpSpPr>
+      <p:grpSpPr>
+        <a:xfrm>
+          <a:off x="0" y="0"/>
+          <a:ext cx="0" cy="0"/>
+          <a:chOff x="0" y="0"/>
+          <a:chExt cx="0" cy="0"/>
+        </a:xfrm>
+      </p:grpSpPr>
+      <p:sp>
+        <p:nvSpPr>
+          <p:cNvPr id="2" name="Title 1">
+            <a:extLst>
+              <a:ext uri="{FF2B5EF4-FFF2-40B4-BE49-F238E27FC236}">
+                <a16:creationId xmlns:a16="http://schemas.microsoft.com/office/drawing/2014/main" id="{EF84C814-87E4-B748-A17C-C4FD2F95F1ED}"/>
+              </a:ext>
+            </a:extLst>
+          </p:cNvPr>
+          <p:cNvSpPr>
+            <a:spLocks noGrp="1"/>
+          </p:cNvSpPr>
+          <p:nvPr>
+            <p:ph type="title"/>
+          </p:nvPr>
+        </p:nvSpPr>
+        <p:spPr/>
+        <p:txBody>
+          <a:bodyPr/>
+          <a:lstStyle/>
+          <a:p>
+            <a:r>
+              <a:rPr lang="en-US" dirty="0"/>
+              <a:t>Outro – 15 seconds</a:t>
+            </a:r>
+          </a:p>
+        </p:txBody>
+      </p:sp>
+      <p:sp>
+        <p:nvSpPr>
+          <p:cNvPr id="3" name="Content Placeholder 2">
+            <a:extLst>
+              <a:ext uri="{FF2B5EF4-FFF2-40B4-BE49-F238E27FC236}">
+                <a16:creationId xmlns:a16="http://schemas.microsoft.com/office/drawing/2014/main" id="{0C29E474-F4E4-DE4E-A187-2BC2D31563CE}"/>
+              </a:ext>
+            </a:extLst>
+          </p:cNvPr>
+          <p:cNvSpPr>
+            <a:spLocks noGrp="1"/>
+          </p:cNvSpPr>
+          <p:nvPr>
+            <p:ph idx="1"/>
+          </p:nvPr>
+        </p:nvSpPr>
+        <p:spPr>
+          <a:xfrm>
+            <a:off x="838199" y="1825625"/>
+            <a:ext cx="10275277" cy="4351338"/>
+          </a:xfrm>
+        </p:spPr>
+        <p:txBody>
+          <a:bodyPr/>
+          <a:lstStyle/>
+          <a:p>
+            <a:r>
+              <a:rPr lang="en-US" dirty="0"/>
+              <a:t>Thanks everyone</a:t>
+            </a:r>
+          </a:p>
+          <a:p>
+            <a:endParaRPr lang="en-US" dirty="0"/>
+          </a:p>
+          <a:p>
+            <a:r>
+              <a:rPr lang="en-US" dirty="0"/>
+              <a:t>Don’t forget you can find out more at </a:t>
+            </a:r>
+            <a:r>
+              <a:rPr lang="en-US" dirty="0" err="1"/>
+              <a:t>www.pro-sight.com.au</a:t>
+            </a:r>
+            <a:endParaRPr lang="en-US" dirty="0"/>
+          </a:p>
+        </p:txBody>
+      </p:sp>
+    </p:spTree>
+    <p:extLst>
+      <p:ext uri="{BB962C8B-B14F-4D97-AF65-F5344CB8AC3E}">
+        <p14:creationId xmlns:p14="http://schemas.microsoft.com/office/powerpoint/2010/main" val="4034525392"/>
+      </p:ext>
+    </p:extLst>
+  </p:cSld>
+  <p:clrMapOvr>
+    <a:masterClrMapping/>
+  </p:clrMapOvr>
+</p:sld>
+</file>
+
+<file path=ppt/slides/slide3.xml><?xml version="1.0" encoding="utf-8"?>
+<p:sld xmlns:a="http://schemas.openxmlformats.org/drawingml/2006/main" xmlns:r="http://schemas.openxmlformats.org/officeDocument/2006/relationships" xmlns:p="http://schemas.openxmlformats.org/presentationml/2006/main">
+  <p:cSld>
+    <p:spTree>
+      <p:nvGrpSpPr>
+        <p:cNvPr id="1" name=""/>
+        <p:cNvGrpSpPr/>
+        <p:nvPr/>
+      </p:nvGrpSpPr>
+      <p:grpSpPr>
+        <a:xfrm>
+          <a:off x="0" y="0"/>
+          <a:ext cx="0" cy="0"/>
+          <a:chOff x="0" y="0"/>
+          <a:chExt cx="0" cy="0"/>
+        </a:xfrm>
+      </p:grpSpPr>
+      <p:sp>
+        <p:nvSpPr>
+          <p:cNvPr id="2" name="Title 1">
+            <a:extLst>
+              <a:ext uri="{FF2B5EF4-FFF2-40B4-BE49-F238E27FC236}">
+                <a16:creationId xmlns:a16="http://schemas.microsoft.com/office/drawing/2014/main" id="{EF84C814-87E4-B748-A17C-C4FD2F95F1ED}"/>
+              </a:ext>
+            </a:extLst>
+          </p:cNvPr>
+          <p:cNvSpPr>
+            <a:spLocks noGrp="1"/>
+          </p:cNvSpPr>
+          <p:nvPr>
+            <p:ph type="title"/>
+          </p:nvPr>
+        </p:nvSpPr>
+        <p:spPr/>
+        <p:txBody>
+          <a:bodyPr/>
+          <a:lstStyle/>
+          <a:p>
+            <a:r>
+              <a:rPr lang="en-US" dirty="0"/>
+              <a:t>Introduction – 15 seconds</a:t>
+            </a:r>
+          </a:p>
+        </p:txBody>
+      </p:sp>
+      <p:sp>
+        <p:nvSpPr>
+          <p:cNvPr id="3" name="Content Placeholder 2">
+            <a:extLst>
+              <a:ext uri="{FF2B5EF4-FFF2-40B4-BE49-F238E27FC236}">
+                <a16:creationId xmlns:a16="http://schemas.microsoft.com/office/drawing/2014/main" id="{0C29E474-F4E4-DE4E-A187-2BC2D31563CE}"/>
+              </a:ext>
+            </a:extLst>
+          </p:cNvPr>
+          <p:cNvSpPr>
+            <a:spLocks noGrp="1"/>
+          </p:cNvSpPr>
+          <p:nvPr>
+            <p:ph idx="1"/>
+          </p:nvPr>
+        </p:nvSpPr>
+        <p:spPr>
+          <a:xfrm>
+            <a:off x="838200" y="1825625"/>
+            <a:ext cx="10515600" cy="4351338"/>
+          </a:xfrm>
+        </p:spPr>
+        <p:txBody>
+          <a:bodyPr>
+            <a:normAutofit lnSpcReduction="10000"/>
+          </a:bodyPr>
+          <a:lstStyle/>
+          <a:p>
+            <a:r>
+              <a:rPr lang="en-US" dirty="0"/>
+              <a:t>Intro and what we are going to talk about</a:t>
+            </a:r>
+          </a:p>
+          <a:p>
+            <a:endParaRPr lang="en-US" dirty="0"/>
+          </a:p>
+          <a:p>
+            <a:r>
+              <a:rPr lang="en-AU" dirty="0"/>
+              <a:t>A 2018 report titled Programme for International Student Assessment (PISA) details the long-term decline in Australian students in Science, Reading and Mathematics subjects in comparison to Chinese students. Specifically, the report details that Australian students are on average 3.5 years behind Chinese students in mathematics. </a:t>
+            </a:r>
+          </a:p>
+          <a:p>
+            <a:endParaRPr lang="en-US" dirty="0"/>
+          </a:p>
+          <a:p>
+            <a:r>
+              <a:rPr lang="en-US" dirty="0"/>
+              <a:t>we’re joined by X from </a:t>
+            </a:r>
+            <a:r>
+              <a:rPr lang="en-US" dirty="0" err="1"/>
+              <a:t>Prosight</a:t>
+            </a:r>
+            <a:r>
+              <a:rPr lang="en-US" dirty="0"/>
+              <a:t> to talk to us about some of the challenges facing students today</a:t>
+            </a:r>
+          </a:p>
+        </p:txBody>
+      </p:sp>
+    </p:spTree>
+    <p:extLst>
+      <p:ext uri="{BB962C8B-B14F-4D97-AF65-F5344CB8AC3E}">
+        <p14:creationId xmlns:p14="http://schemas.microsoft.com/office/powerpoint/2010/main" val="704425647"/>
+      </p:ext>
+    </p:extLst>
+  </p:cSld>
+  <p:clrMapOvr>
+    <a:masterClrMapping/>
+  </p:clrMapOvr>
+</p:sld>
+</file>
+
+<file path=ppt/slides/slide4.xml><?xml version="1.0" encoding="utf-8"?>
+<p:sld xmlns:a="http://schemas.openxmlformats.org/drawingml/2006/main" xmlns:r="http://schemas.openxmlformats.org/officeDocument/2006/relationships" xmlns:p="http://schemas.openxmlformats.org/presentationml/2006/main">
+  <p:cSld>
+    <p:spTree>
+      <p:nvGrpSpPr>
+        <p:cNvPr id="1" name=""/>
+        <p:cNvGrpSpPr/>
+        <p:nvPr/>
+      </p:nvGrpSpPr>
+      <p:grpSpPr>
+        <a:xfrm>
+          <a:off x="0" y="0"/>
+          <a:ext cx="0" cy="0"/>
+          <a:chOff x="0" y="0"/>
+          <a:chExt cx="0" cy="0"/>
+        </a:xfrm>
+      </p:grpSpPr>
+      <p:sp>
+        <p:nvSpPr>
+          <p:cNvPr id="2" name="Title 1">
+            <a:extLst>
+              <a:ext uri="{FF2B5EF4-FFF2-40B4-BE49-F238E27FC236}">
+                <a16:creationId xmlns:a16="http://schemas.microsoft.com/office/drawing/2014/main" id="{B9395550-3173-2F44-A17F-ECB8F46226BF}"/>
+              </a:ext>
+            </a:extLst>
+          </p:cNvPr>
+          <p:cNvSpPr>
+            <a:spLocks noGrp="1"/>
+          </p:cNvSpPr>
+          <p:nvPr>
+            <p:ph type="title"/>
+          </p:nvPr>
+        </p:nvSpPr>
+        <p:spPr/>
+        <p:txBody>
+          <a:bodyPr/>
+          <a:lstStyle/>
+          <a:p>
+            <a:r>
+              <a:rPr lang="en-US" dirty="0"/>
+              <a:t>Introduction – Script - Alex</a:t>
+            </a:r>
+          </a:p>
+        </p:txBody>
+      </p:sp>
+      <p:sp>
+        <p:nvSpPr>
+          <p:cNvPr id="3" name="Content Placeholder 2">
+            <a:extLst>
+              <a:ext uri="{FF2B5EF4-FFF2-40B4-BE49-F238E27FC236}">
+                <a16:creationId xmlns:a16="http://schemas.microsoft.com/office/drawing/2014/main" id="{3EBFF5F1-1C5E-504D-BF65-3ECE78597D6D}"/>
+              </a:ext>
+            </a:extLst>
+          </p:cNvPr>
+          <p:cNvSpPr>
+            <a:spLocks noGrp="1"/>
+          </p:cNvSpPr>
+          <p:nvPr>
+            <p:ph idx="1"/>
+          </p:nvPr>
+        </p:nvSpPr>
+        <p:spPr/>
+        <p:txBody>
+          <a:bodyPr>
+            <a:normAutofit fontScale="92500" lnSpcReduction="10000"/>
+          </a:bodyPr>
+          <a:lstStyle/>
+          <a:p>
+            <a:r>
+              <a:rPr lang="en-US" dirty="0"/>
+              <a:t>Hi, I’m Alex Barron and thanks for joining us for our education segment today.  Recently, we’ve been looking at the standards of education in Australia and I’m pleased to be joined by the team from </a:t>
+            </a:r>
+            <a:r>
+              <a:rPr lang="en-US" dirty="0" err="1"/>
+              <a:t>Prosight</a:t>
+            </a:r>
+            <a:r>
+              <a:rPr lang="en-US" dirty="0"/>
+              <a:t> today.</a:t>
+            </a:r>
+          </a:p>
+          <a:p>
+            <a:endParaRPr lang="en-US" dirty="0"/>
+          </a:p>
+          <a:p>
+            <a:r>
+              <a:rPr lang="en-US" dirty="0"/>
+              <a:t> </a:t>
+            </a:r>
+            <a:r>
+              <a:rPr lang="en-US" dirty="0" err="1"/>
+              <a:t>Prosight</a:t>
+            </a:r>
+            <a:r>
+              <a:rPr lang="en-US" dirty="0"/>
+              <a:t> is a new company that’s working with learners to change the way they learn.  We’re joined today by Brandon, Emily, Shane and Natalie to talk through some of the challenges that we’re seeing with Australian education.</a:t>
+            </a:r>
+          </a:p>
+          <a:p>
+            <a:endParaRPr lang="en-US" dirty="0"/>
+          </a:p>
+          <a:p>
+            <a:r>
+              <a:rPr lang="en-US" dirty="0"/>
+              <a:t>Brandon, thanks for joining us, can you tell us a bit about the problems that you’re seeing today with online learners?</a:t>
+            </a:r>
+          </a:p>
+        </p:txBody>
+      </p:sp>
+    </p:spTree>
+    <p:extLst>
+      <p:ext uri="{BB962C8B-B14F-4D97-AF65-F5344CB8AC3E}">
+        <p14:creationId xmlns:p14="http://schemas.microsoft.com/office/powerpoint/2010/main" val="3117266682"/>
+      </p:ext>
+    </p:extLst>
+  </p:cSld>
+  <p:clrMapOvr>
+    <a:masterClrMapping/>
+  </p:clrMapOvr>
+</p:sld>
+</file>
+
+<file path=ppt/slides/slide5.xml><?xml version="1.0" encoding="utf-8"?>
+<p:sld xmlns:a="http://schemas.openxmlformats.org/drawingml/2006/main" xmlns:r="http://schemas.openxmlformats.org/officeDocument/2006/relationships" xmlns:p="http://schemas.openxmlformats.org/presentationml/2006/main">
+  <p:cSld>
+    <p:spTree>
+      <p:nvGrpSpPr>
+        <p:cNvPr id="1" name=""/>
+        <p:cNvGrpSpPr/>
+        <p:nvPr/>
+      </p:nvGrpSpPr>
+      <p:grpSpPr>
+        <a:xfrm>
+          <a:off x="0" y="0"/>
+          <a:ext cx="0" cy="0"/>
+          <a:chOff x="0" y="0"/>
+          <a:chExt cx="0" cy="0"/>
+        </a:xfrm>
+      </p:grpSpPr>
+      <p:sp>
+        <p:nvSpPr>
+          <p:cNvPr id="2" name="Title 1">
+            <a:extLst>
+              <a:ext uri="{FF2B5EF4-FFF2-40B4-BE49-F238E27FC236}">
                 <a16:creationId xmlns:a16="http://schemas.microsoft.com/office/drawing/2014/main" id="{0AFF2694-842C-7D49-8743-E67E62B7CE29}"/>
               </a:ext>
             </a:extLst>
@@ -4667,7 +5609,7 @@
           <a:p>
             <a:r>
               <a:rPr lang="en-US" dirty="0"/>
-              <a:t>Why is the team doing this ?- 30 seconds</a:t>
+              <a:t>What is the problem – 60 seconds</a:t>
             </a:r>
           </a:p>
         </p:txBody>
@@ -4903,31 +5845,266 @@
           </a:p>
           <a:p>
             <a:r>
-              <a:rPr lang="en-AU" dirty="0"/>
-              <a:t>Explain our motivations</a:t>
-            </a:r>
-          </a:p>
-          <a:p>
-            <a:endParaRPr lang="en-AU" dirty="0"/>
-          </a:p>
-          <a:p>
-            <a:r>
-              <a:rPr lang="en-AU" dirty="0"/>
-              <a:t>How it can change lives</a:t>
-            </a:r>
-          </a:p>
-          <a:p>
-            <a:endParaRPr lang="en-AU" dirty="0"/>
+              <a:rPr lang="en-US" dirty="0"/>
+              <a:t>Script along the lines of “What is the problem being faced by online learners, here is X member from </a:t>
+            </a:r>
+            <a:r>
+              <a:rPr lang="en-US" dirty="0" err="1"/>
+              <a:t>prosight</a:t>
+            </a:r>
+            <a:r>
+              <a:rPr lang="en-US" dirty="0"/>
+              <a:t>”</a:t>
+            </a:r>
           </a:p>
           <a:p>
             <a:endParaRPr lang="en-US" dirty="0"/>
+          </a:p>
+          <a:p>
+            <a:r>
+              <a:rPr lang="en-US" dirty="0" err="1"/>
+              <a:t>Prosight</a:t>
+            </a:r>
+            <a:r>
+              <a:rPr lang="en-US" dirty="0"/>
+              <a:t> member X to illustrate the challenges of online learning</a:t>
+            </a:r>
           </a:p>
         </p:txBody>
       </p:sp>
     </p:spTree>
     <p:extLst>
       <p:ext uri="{BB962C8B-B14F-4D97-AF65-F5344CB8AC3E}">
-        <p14:creationId xmlns:p14="http://schemas.microsoft.com/office/powerpoint/2010/main" val="1057856342"/>
+        <p14:creationId xmlns:p14="http://schemas.microsoft.com/office/powerpoint/2010/main" val="2716251402"/>
+      </p:ext>
+    </p:extLst>
+  </p:cSld>
+  <p:clrMapOvr>
+    <a:masterClrMapping/>
+  </p:clrMapOvr>
+</p:sld>
+</file>
+
+<file path=ppt/slides/slide6.xml><?xml version="1.0" encoding="utf-8"?>
+<p:sld xmlns:a="http://schemas.openxmlformats.org/drawingml/2006/main" xmlns:r="http://schemas.openxmlformats.org/officeDocument/2006/relationships" xmlns:p="http://schemas.openxmlformats.org/presentationml/2006/main">
+  <p:cSld>
+    <p:spTree>
+      <p:nvGrpSpPr>
+        <p:cNvPr id="1" name=""/>
+        <p:cNvGrpSpPr/>
+        <p:nvPr/>
+      </p:nvGrpSpPr>
+      <p:grpSpPr>
+        <a:xfrm>
+          <a:off x="0" y="0"/>
+          <a:ext cx="0" cy="0"/>
+          <a:chOff x="0" y="0"/>
+          <a:chExt cx="0" cy="0"/>
+        </a:xfrm>
+      </p:grpSpPr>
+      <p:sp>
+        <p:nvSpPr>
+          <p:cNvPr id="2" name="Title 1">
+            <a:extLst>
+              <a:ext uri="{FF2B5EF4-FFF2-40B4-BE49-F238E27FC236}">
+                <a16:creationId xmlns:a16="http://schemas.microsoft.com/office/drawing/2014/main" id="{B9395550-3173-2F44-A17F-ECB8F46226BF}"/>
+              </a:ext>
+            </a:extLst>
+          </p:cNvPr>
+          <p:cNvSpPr>
+            <a:spLocks noGrp="1"/>
+          </p:cNvSpPr>
+          <p:nvPr>
+            <p:ph type="title"/>
+          </p:nvPr>
+        </p:nvSpPr>
+        <p:spPr/>
+        <p:txBody>
+          <a:bodyPr/>
+          <a:lstStyle/>
+          <a:p>
+            <a:r>
+              <a:rPr lang="en-US" dirty="0"/>
+              <a:t>What is the problem – Script - Brandon</a:t>
+            </a:r>
+          </a:p>
+        </p:txBody>
+      </p:sp>
+      <p:sp>
+        <p:nvSpPr>
+          <p:cNvPr id="3" name="Content Placeholder 2">
+            <a:extLst>
+              <a:ext uri="{FF2B5EF4-FFF2-40B4-BE49-F238E27FC236}">
+                <a16:creationId xmlns:a16="http://schemas.microsoft.com/office/drawing/2014/main" id="{3EBFF5F1-1C5E-504D-BF65-3ECE78597D6D}"/>
+              </a:ext>
+            </a:extLst>
+          </p:cNvPr>
+          <p:cNvSpPr>
+            <a:spLocks noGrp="1"/>
+          </p:cNvSpPr>
+          <p:nvPr>
+            <p:ph idx="1"/>
+          </p:nvPr>
+        </p:nvSpPr>
+        <p:spPr/>
+        <p:txBody>
+          <a:bodyPr>
+            <a:normAutofit/>
+          </a:bodyPr>
+          <a:lstStyle/>
+          <a:p>
+            <a:r>
+              <a:rPr lang="en-US" dirty="0"/>
+              <a:t>Talk about the problems being faced today, </a:t>
+            </a:r>
+            <a:r>
+              <a:rPr lang="en-US" dirty="0" err="1"/>
+              <a:t>eg</a:t>
+            </a:r>
+            <a:r>
+              <a:rPr lang="en-US" dirty="0"/>
+              <a:t> </a:t>
+            </a:r>
+            <a:r>
+              <a:rPr lang="en-AU" dirty="0"/>
+              <a:t>A 2018 report titled Programme for International Student Assessment (PISA) details the long-term decline in Australian students in Science, Reading and Mathematics subjects in comparison to Chinese students. Specifically, the report details that Australian students are on average 3.5 years behind Chinese students in mathematics.</a:t>
+            </a:r>
+          </a:p>
+          <a:p>
+            <a:endParaRPr lang="en-AU" dirty="0"/>
+          </a:p>
+          <a:p>
+            <a:r>
+              <a:rPr lang="en-AU" dirty="0"/>
+              <a:t>Online learning is harder, people don’t know how to learn best etc.  With classrooms, students learn in different ways etc. </a:t>
+            </a:r>
+          </a:p>
+          <a:p>
+            <a:endParaRPr lang="en-US" dirty="0"/>
+          </a:p>
+        </p:txBody>
+      </p:sp>
+    </p:spTree>
+    <p:extLst>
+      <p:ext uri="{BB962C8B-B14F-4D97-AF65-F5344CB8AC3E}">
+        <p14:creationId xmlns:p14="http://schemas.microsoft.com/office/powerpoint/2010/main" val="1825538211"/>
+      </p:ext>
+    </p:extLst>
+  </p:cSld>
+  <p:clrMapOvr>
+    <a:masterClrMapping/>
+  </p:clrMapOvr>
+</p:sld>
+</file>
+
+<file path=ppt/slides/slide7.xml><?xml version="1.0" encoding="utf-8"?>
+<p:sld xmlns:a="http://schemas.openxmlformats.org/drawingml/2006/main" xmlns:r="http://schemas.openxmlformats.org/officeDocument/2006/relationships" xmlns:p="http://schemas.openxmlformats.org/presentationml/2006/main">
+  <p:cSld>
+    <p:spTree>
+      <p:nvGrpSpPr>
+        <p:cNvPr id="1" name=""/>
+        <p:cNvGrpSpPr/>
+        <p:nvPr/>
+      </p:nvGrpSpPr>
+      <p:grpSpPr>
+        <a:xfrm>
+          <a:off x="0" y="0"/>
+          <a:ext cx="0" cy="0"/>
+          <a:chOff x="0" y="0"/>
+          <a:chExt cx="0" cy="0"/>
+        </a:xfrm>
+      </p:grpSpPr>
+      <p:sp>
+        <p:nvSpPr>
+          <p:cNvPr id="2" name="Title 1">
+            <a:extLst>
+              <a:ext uri="{FF2B5EF4-FFF2-40B4-BE49-F238E27FC236}">
+                <a16:creationId xmlns:a16="http://schemas.microsoft.com/office/drawing/2014/main" id="{B9395550-3173-2F44-A17F-ECB8F46226BF}"/>
+              </a:ext>
+            </a:extLst>
+          </p:cNvPr>
+          <p:cNvSpPr>
+            <a:spLocks noGrp="1"/>
+          </p:cNvSpPr>
+          <p:nvPr>
+            <p:ph type="title"/>
+          </p:nvPr>
+        </p:nvSpPr>
+        <p:spPr/>
+        <p:txBody>
+          <a:bodyPr/>
+          <a:lstStyle/>
+          <a:p>
+            <a:r>
+              <a:rPr lang="en-US" dirty="0"/>
+              <a:t>What is the problem – Script - Alex</a:t>
+            </a:r>
+          </a:p>
+        </p:txBody>
+      </p:sp>
+      <p:sp>
+        <p:nvSpPr>
+          <p:cNvPr id="3" name="Content Placeholder 2">
+            <a:extLst>
+              <a:ext uri="{FF2B5EF4-FFF2-40B4-BE49-F238E27FC236}">
+                <a16:creationId xmlns:a16="http://schemas.microsoft.com/office/drawing/2014/main" id="{3EBFF5F1-1C5E-504D-BF65-3ECE78597D6D}"/>
+              </a:ext>
+            </a:extLst>
+          </p:cNvPr>
+          <p:cNvSpPr>
+            <a:spLocks noGrp="1"/>
+          </p:cNvSpPr>
+          <p:nvPr>
+            <p:ph idx="1"/>
+          </p:nvPr>
+        </p:nvSpPr>
+        <p:spPr/>
+        <p:txBody>
+          <a:bodyPr>
+            <a:normAutofit/>
+          </a:bodyPr>
+          <a:lstStyle/>
+          <a:p>
+            <a:r>
+              <a:rPr lang="en-AU" dirty="0"/>
+              <a:t>Thanks Brandon, that’s a really good overview of some of the issues that students are seeing.  I can see that there is a real gap that we’re missing here in Australia.</a:t>
+            </a:r>
+          </a:p>
+          <a:p>
+            <a:endParaRPr lang="en-AU" dirty="0"/>
+          </a:p>
+          <a:p>
+            <a:r>
+              <a:rPr lang="en-AU" dirty="0"/>
+              <a:t>This can’t be a new problem though, online learning has been around for a number of years now.  What have people been doing up to now?</a:t>
+            </a:r>
+          </a:p>
+          <a:p>
+            <a:endParaRPr lang="en-AU" dirty="0"/>
+          </a:p>
+          <a:p>
+            <a:r>
+              <a:rPr lang="en-AU" dirty="0"/>
+              <a:t>We have one of the lead researchers XXXX from </a:t>
+            </a:r>
+            <a:r>
+              <a:rPr lang="en-AU" dirty="0" err="1"/>
+              <a:t>Prosight</a:t>
+            </a:r>
+            <a:r>
+              <a:rPr lang="en-AU" dirty="0"/>
+              <a:t> here with us today.  XXXX, what are we doing right now to address these issues?</a:t>
+            </a:r>
+          </a:p>
+          <a:p>
+            <a:endParaRPr lang="en-US" dirty="0"/>
+          </a:p>
+        </p:txBody>
+      </p:sp>
+    </p:spTree>
+    <p:extLst>
+      <p:ext uri="{BB962C8B-B14F-4D97-AF65-F5344CB8AC3E}">
+        <p14:creationId xmlns:p14="http://schemas.microsoft.com/office/powerpoint/2010/main" val="1595671160"/>
       </p:ext>
     </p:extLst>
   </p:cSld>
@@ -4977,7 +6154,7 @@
           <a:p>
             <a:r>
               <a:rPr lang="en-US" dirty="0"/>
-              <a:t>How can I find out more? 30 seconds</a:t>
+              <a:t>What steps are we taking as Australians? – 60 seconds</a:t>
             </a:r>
           </a:p>
         </p:txBody>
@@ -5213,39 +6390,16 @@
           </a:p>
           <a:p>
             <a:r>
-              <a:rPr lang="en-AU" dirty="0"/>
-              <a:t>Cover off cost (free)</a:t>
-            </a:r>
-          </a:p>
-          <a:p>
-            <a:endParaRPr lang="en-AU" dirty="0"/>
-          </a:p>
-          <a:p>
-            <a:r>
-              <a:rPr lang="en-AU" dirty="0"/>
-              <a:t>Cover off that it will be launching soon for Australia</a:t>
-            </a:r>
-            <a:r>
-              <a:rPr lang="en-AU"/>
-              <a:t>, later </a:t>
-            </a:r>
-            <a:r>
-              <a:rPr lang="en-AU" dirty="0"/>
-              <a:t>in the rest of the world</a:t>
-            </a:r>
-          </a:p>
-          <a:p>
-            <a:endParaRPr lang="en-AU" dirty="0"/>
-          </a:p>
-          <a:p>
-            <a:endParaRPr lang="en-US" dirty="0"/>
+              <a:rPr lang="en-US" dirty="0"/>
+              <a:t>Illustrate the points that there are solutions out there, however none of them are really understanding the needs of the student and are bespoke</a:t>
+            </a:r>
           </a:p>
         </p:txBody>
       </p:sp>
     </p:spTree>
     <p:extLst>
       <p:ext uri="{BB962C8B-B14F-4D97-AF65-F5344CB8AC3E}">
-        <p14:creationId xmlns:p14="http://schemas.microsoft.com/office/powerpoint/2010/main" val="1265038317"/>
+        <p14:creationId xmlns:p14="http://schemas.microsoft.com/office/powerpoint/2010/main" val="2168259597"/>
       </p:ext>
     </p:extLst>
   </p:cSld>
@@ -5277,7 +6431,7 @@
           <p:cNvPr id="2" name="Title 1">
             <a:extLst>
               <a:ext uri="{FF2B5EF4-FFF2-40B4-BE49-F238E27FC236}">
-                <a16:creationId xmlns:a16="http://schemas.microsoft.com/office/drawing/2014/main" id="{EF84C814-87E4-B748-A17C-C4FD2F95F1ED}"/>
+                <a16:creationId xmlns:a16="http://schemas.microsoft.com/office/drawing/2014/main" id="{B9395550-3173-2F44-A17F-ECB8F46226BF}"/>
               </a:ext>
             </a:extLst>
           </p:cNvPr>
@@ -5295,7 +6449,7 @@
           <a:p>
             <a:r>
               <a:rPr lang="en-US" dirty="0"/>
-              <a:t>Outro – 15 seconds</a:t>
+              <a:t>What steps are we taking as Australians? – Script - XXXX</a:t>
             </a:r>
           </a:p>
         </p:txBody>
@@ -5305,7 +6459,7 @@
           <p:cNvPr id="3" name="Content Placeholder 2">
             <a:extLst>
               <a:ext uri="{FF2B5EF4-FFF2-40B4-BE49-F238E27FC236}">
-                <a16:creationId xmlns:a16="http://schemas.microsoft.com/office/drawing/2014/main" id="{0C29E474-F4E4-DE4E-A187-2BC2D31563CE}"/>
+                <a16:creationId xmlns:a16="http://schemas.microsoft.com/office/drawing/2014/main" id="{3EBFF5F1-1C5E-504D-BF65-3ECE78597D6D}"/>
               </a:ext>
             </a:extLst>
           </p:cNvPr>
@@ -5316,33 +6470,19 @@
             <p:ph idx="1"/>
           </p:nvPr>
         </p:nvSpPr>
-        <p:spPr>
-          <a:xfrm>
-            <a:off x="838199" y="1825625"/>
-            <a:ext cx="10275277" cy="4351338"/>
-          </a:xfrm>
-        </p:spPr>
-        <p:txBody>
-          <a:bodyPr/>
-          <a:lstStyle/>
-          <a:p>
-            <a:r>
-              <a:rPr lang="en-US" dirty="0"/>
-              <a:t>Thanks everyone</a:t>
-            </a:r>
-          </a:p>
-          <a:p>
-            <a:endParaRPr lang="en-US" dirty="0"/>
-          </a:p>
-          <a:p>
-            <a:r>
-              <a:rPr lang="en-US" dirty="0"/>
-              <a:t>Don’t forget you can find out more at </a:t>
-            </a:r>
-            <a:r>
-              <a:rPr lang="en-US" dirty="0" err="1"/>
-              <a:t>www.pro-sight.com.au</a:t>
-            </a:r>
+        <p:spPr/>
+        <p:txBody>
+          <a:bodyPr>
+            <a:normAutofit/>
+          </a:bodyPr>
+          <a:lstStyle/>
+          <a:p>
+            <a:r>
+              <a:rPr lang="en-AU" dirty="0"/>
+              <a:t>Talk about existing platforms, learning quizzes, all classroom education is the same, not really helping people.   Plenty of things out there, but you have to go and look for it.</a:t>
+            </a:r>
+          </a:p>
+          <a:p>
             <a:endParaRPr lang="en-US" dirty="0"/>
           </a:p>
         </p:txBody>
@@ -5350,7 +6490,7 @@
     </p:spTree>
     <p:extLst>
       <p:ext uri="{BB962C8B-B14F-4D97-AF65-F5344CB8AC3E}">
-        <p14:creationId xmlns:p14="http://schemas.microsoft.com/office/powerpoint/2010/main" val="4034525392"/>
+        <p14:creationId xmlns:p14="http://schemas.microsoft.com/office/powerpoint/2010/main" val="3546889449"/>
       </p:ext>
     </p:extLst>
   </p:cSld>

</xml_diff>